<commit_message>
Updated Day 4 - Slides and materials.
</commit_message>
<xml_diff>
--- a/Day 3/Slides/4. Blue green deployment using ALB/blue-green-deployment-using-ALB-slides.pptx
+++ b/Day 3/Slides/4. Blue green deployment using ALB/blue-green-deployment-using-ALB-slides.pptx
@@ -5,7 +5,7 @@
     <p:sldMasterId id="2147483648" r:id="rId1"/>
   </p:sldMasterIdLst>
   <p:notesMasterIdLst>
-    <p:notesMasterId r:id="rId8"/>
+    <p:notesMasterId r:id="rId9"/>
   </p:notesMasterIdLst>
   <p:sldIdLst>
     <p:sldId id="257" r:id="rId3"/>
@@ -13,6 +13,7 @@
     <p:sldId id="258" r:id="rId5"/>
     <p:sldId id="256" r:id="rId6"/>
     <p:sldId id="259" r:id="rId7"/>
+    <p:sldId id="265" r:id="rId8"/>
   </p:sldIdLst>
   <p:sldSz cx="12192000" cy="6858000"/>
   <p:notesSz cx="6858000" cy="9144000"/>
@@ -3804,6 +3805,201 @@
           </a:ln>
         </p:spPr>
       </p:pic>
+    </p:spTree>
+  </p:cSld>
+  <p:clrMapOvr>
+    <a:masterClrMapping/>
+  </p:clrMapOvr>
+</p:sld>
+</file>
+
+<file path=ppt/slides/slide6.xml><?xml version="1.0" encoding="utf-8"?>
+<p:sld xmlns:a="http://schemas.openxmlformats.org/drawingml/2006/main" xmlns:r="http://schemas.openxmlformats.org/officeDocument/2006/relationships" xmlns:p="http://schemas.openxmlformats.org/presentationml/2006/main">
+  <p:cSld>
+    <p:spTree>
+      <p:nvGrpSpPr>
+        <p:cNvPr id="1" name=""/>
+        <p:cNvGrpSpPr/>
+        <p:nvPr/>
+      </p:nvGrpSpPr>
+      <p:grpSpPr/>
+      <p:sp>
+        <p:nvSpPr>
+          <p:cNvPr id="2" name="Title 1"/>
+          <p:cNvSpPr>
+            <a:spLocks noGrp="1"/>
+          </p:cNvSpPr>
+          <p:nvPr>
+            <p:ph type="title"/>
+          </p:nvPr>
+        </p:nvSpPr>
+        <p:spPr/>
+        <p:txBody>
+          <a:bodyPr/>
+          <a:p>
+            <a:pPr algn="ctr"/>
+            <a:r>
+              <a:rPr lang="en-US"/>
+              <a:t>Pricing</a:t>
+            </a:r>
+            <a:endParaRPr lang="en-US"/>
+          </a:p>
+        </p:txBody>
+      </p:sp>
+      <p:sp>
+        <p:nvSpPr>
+          <p:cNvPr id="3" name="Content Placeholder 2"/>
+          <p:cNvSpPr>
+            <a:spLocks noGrp="1"/>
+          </p:cNvSpPr>
+          <p:nvPr>
+            <p:ph idx="1"/>
+          </p:nvPr>
+        </p:nvSpPr>
+        <p:spPr>
+          <a:xfrm>
+            <a:off x="838200" y="1825625"/>
+            <a:ext cx="10515600" cy="1803400"/>
+          </a:xfrm>
+        </p:spPr>
+        <p:txBody>
+          <a:bodyPr>
+            <a:noAutofit/>
+          </a:bodyPr>
+          <a:p>
+            <a:r>
+              <a:rPr lang="en-US" sz="2400"/>
+              <a:t>Classic Load Balancer=$0.025*24hours*2instances=$1.2 per day.</a:t>
+            </a:r>
+            <a:endParaRPr lang="en-US" sz="2400"/>
+          </a:p>
+          <a:p>
+            <a:endParaRPr lang="en-US" sz="2400"/>
+          </a:p>
+          <a:p>
+            <a:r>
+              <a:rPr lang="en-US" sz="2400"/>
+              <a:t>Application Load Balancer=$0.0252*24hours*1instance=$0.54 per day.</a:t>
+            </a:r>
+            <a:endParaRPr lang="en-US" sz="2400"/>
+          </a:p>
+          <a:p>
+            <a:endParaRPr lang="en-US" sz="2400"/>
+          </a:p>
+          <a:p>
+            <a:pPr marL="0" indent="0">
+              <a:buNone/>
+            </a:pPr>
+            <a:r>
+              <a:rPr lang="en-US" sz="2400"/>
+              <a:t>  </a:t>
+            </a:r>
+            <a:endParaRPr lang="en-US" sz="2400"/>
+          </a:p>
+        </p:txBody>
+      </p:sp>
+      <p:sp>
+        <p:nvSpPr>
+          <p:cNvPr id="4" name="Slide Number Placeholder 3"/>
+          <p:cNvSpPr>
+            <a:spLocks noGrp="1"/>
+          </p:cNvSpPr>
+          <p:nvPr>
+            <p:ph type="sldNum" sz="quarter" idx="12"/>
+          </p:nvPr>
+        </p:nvSpPr>
+        <p:spPr/>
+        <p:txBody>
+          <a:bodyPr/>
+          <a:p>
+            <a:fld id="{9B618960-8005-486C-9A75-10CB2AAC16F9}" type="slidenum">
+              <a:rPr lang="en-US" smtClean="0"/>
+            </a:fld>
+            <a:endParaRPr lang="en-US"/>
+          </a:p>
+        </p:txBody>
+      </p:sp>
+      <p:sp>
+        <p:nvSpPr>
+          <p:cNvPr id="5" name="Right Arrow 4"/>
+          <p:cNvSpPr/>
+          <p:nvPr/>
+        </p:nvSpPr>
+        <p:spPr>
+          <a:xfrm>
+            <a:off x="1141730" y="4445000"/>
+            <a:ext cx="1116330" cy="744855"/>
+          </a:xfrm>
+          <a:prstGeom prst="rightArrow">
+            <a:avLst/>
+          </a:prstGeom>
+        </p:spPr>
+        <p:style>
+          <a:lnRef idx="2">
+            <a:schemeClr val="accent1">
+              <a:shade val="50000"/>
+            </a:schemeClr>
+          </a:lnRef>
+          <a:fillRef idx="1">
+            <a:schemeClr val="accent1"/>
+          </a:fillRef>
+          <a:effectRef idx="0">
+            <a:schemeClr val="accent1"/>
+          </a:effectRef>
+          <a:fontRef idx="minor">
+            <a:schemeClr val="lt1"/>
+          </a:fontRef>
+        </p:style>
+        <p:txBody>
+          <a:bodyPr rtlCol="0" anchor="ctr"/>
+          <a:p>
+            <a:pPr algn="ctr"/>
+            <a:endParaRPr lang="en-US"/>
+          </a:p>
+        </p:txBody>
+      </p:sp>
+      <p:sp>
+        <p:nvSpPr>
+          <p:cNvPr id="6" name="Text Box 5"/>
+          <p:cNvSpPr txBox="1"/>
+          <p:nvPr/>
+        </p:nvSpPr>
+        <p:spPr>
+          <a:xfrm>
+            <a:off x="2625725" y="4495165"/>
+            <a:ext cx="8112760" cy="829945"/>
+          </a:xfrm>
+          <a:prstGeom prst="rect">
+            <a:avLst/>
+          </a:prstGeom>
+          <a:noFill/>
+        </p:spPr>
+        <p:txBody>
+          <a:bodyPr wrap="square" rtlCol="0">
+            <a:spAutoFit/>
+          </a:bodyPr>
+          <a:p>
+            <a:pPr marL="0" indent="0" algn="ctr">
+              <a:buNone/>
+            </a:pPr>
+            <a:r>
+              <a:rPr lang="en-US" sz="2400" b="1">
+                <a:solidFill>
+                  <a:srgbClr val="0070C0"/>
+                </a:solidFill>
+                <a:sym typeface="+mn-ea"/>
+              </a:rPr>
+              <a:t>the cost of Application Load Balancer is 10% lower than that of a Classic Load Balancer. </a:t>
+            </a:r>
+            <a:endParaRPr lang="en-US" sz="2400" b="1">
+              <a:solidFill>
+                <a:srgbClr val="0070C0"/>
+              </a:solidFill>
+              <a:sym typeface="+mn-ea"/>
+            </a:endParaRPr>
+          </a:p>
+        </p:txBody>
+      </p:sp>
     </p:spTree>
   </p:cSld>
   <p:clrMapOvr>

</xml_diff>